<commit_message>
Comentarios en archivo OSCAR
</commit_message>
<xml_diff>
--- a/OSCAR.pptx
+++ b/OSCAR.pptx
@@ -117,6 +117,22 @@
       </a:defRPr>
     </a:lvl9pPr>
   </p:defaultTextStyle>
+  <p:extLst>
+    <p:ext uri="{EFAFB233-063F-42B5-8137-9DF3F51BA10A}">
+      <p15:sldGuideLst xmlns:p15="http://schemas.microsoft.com/office/powerpoint/2012/main">
+        <p15:guide id="1" orient="horz" pos="2160">
+          <p15:clr>
+            <a:srgbClr val="A4A3A4"/>
+          </p15:clr>
+        </p15:guide>
+        <p15:guide id="2" pos="2880">
+          <p15:clr>
+            <a:srgbClr val="A4A3A4"/>
+          </p15:clr>
+        </p15:guide>
+      </p15:sldGuideLst>
+    </p:ext>
+  </p:extLst>
 </p:presentation>
 </file>
 
@@ -4850,6 +4866,13 @@
   <p:clrMapOvr>
     <a:masterClrMapping/>
   </p:clrMapOvr>
+  <p:timing>
+    <p:tnLst>
+      <p:par>
+        <p:cTn id="1" dur="indefinite" restart="never" nodeType="tmRoot"/>
+      </p:par>
+    </p:tnLst>
+  </p:timing>
 </p:sld>
 </file>
 
@@ -5161,12 +5184,20 @@
           </a:lstStyle>
           <a:p>
             <a:r>
-              <a:rPr lang="es-MX" sz="3200" smtClean="0">
+              <a:rPr lang="es-MX" sz="3200" dirty="0" err="1" smtClean="0">
                 <a:solidFill>
                   <a:srgbClr val="FF0000"/>
                 </a:solidFill>
               </a:rPr>
-              <a:t>anonimo: </a:t>
+              <a:t>anonimo</a:t>
+            </a:r>
+            <a:r>
+              <a:rPr lang="es-MX" sz="3200" dirty="0" smtClean="0">
+                <a:solidFill>
+                  <a:srgbClr val="FF0000"/>
+                </a:solidFill>
+              </a:rPr>
+              <a:t>: </a:t>
             </a:r>
             <a:r>
               <a:rPr lang="es-MX" sz="3200" dirty="0" smtClean="0"/>
@@ -5193,8 +5224,8 @@
         </p:nvSpPr>
         <p:spPr>
           <a:xfrm>
-            <a:off x="657284" y="5682105"/>
-            <a:ext cx="8229600" cy="1143000"/>
+            <a:off x="323528" y="6279699"/>
+            <a:ext cx="8711305" cy="330055"/>
           </a:xfrm>
           <a:prstGeom prst="rect">
             <a:avLst/>
@@ -5222,6 +5253,59 @@
           </a:lstStyle>
           <a:p>
             <a:r>
+              <a:rPr lang="es-MX" sz="3200" smtClean="0">
+                <a:solidFill>
+                  <a:srgbClr val="FF0000"/>
+                </a:solidFill>
+              </a:rPr>
+              <a:t>Javier Lizárraga: </a:t>
+            </a:r>
+            <a:r>
+              <a:rPr lang="es-MX" sz="3200" dirty="0" smtClean="0"/>
+              <a:t>Muy buen formato de presentación, además de interesante.</a:t>
+            </a:r>
+          </a:p>
+        </p:txBody>
+      </p:sp>
+      <p:sp>
+        <p:nvSpPr>
+          <p:cNvPr id="9" name="1 Título"/>
+          <p:cNvSpPr txBox="1">
+            <a:spLocks/>
+          </p:cNvSpPr>
+          <p:nvPr/>
+        </p:nvSpPr>
+        <p:spPr>
+          <a:xfrm>
+            <a:off x="805233" y="5682105"/>
+            <a:ext cx="8229600" cy="330055"/>
+          </a:xfrm>
+          <a:prstGeom prst="rect">
+            <a:avLst/>
+          </a:prstGeom>
+        </p:spPr>
+        <p:txBody>
+          <a:bodyPr vert="horz" lIns="91440" tIns="45720" rIns="91440" bIns="45720" rtlCol="0" anchor="ctr">
+            <a:noAutofit/>
+          </a:bodyPr>
+          <a:lstStyle>
+            <a:lvl1pPr algn="ctr" defTabSz="914400" rtl="0" eaLnBrk="1" latinLnBrk="0" hangingPunct="1">
+              <a:spcBef>
+                <a:spcPct val="0"/>
+              </a:spcBef>
+              <a:buNone/>
+              <a:defRPr sz="4400" kern="1200">
+                <a:solidFill>
+                  <a:schemeClr val="tx1"/>
+                </a:solidFill>
+                <a:latin typeface="+mj-lt"/>
+                <a:ea typeface="+mj-ea"/>
+                <a:cs typeface="+mj-cs"/>
+              </a:defRPr>
+            </a:lvl1pPr>
+          </a:lstStyle>
+          <a:p>
+            <a:r>
               <a:rPr lang="es-MX" sz="3200" dirty="0" smtClean="0">
                 <a:solidFill>
                   <a:srgbClr val="FF0000"/>
@@ -5247,6 +5331,13 @@
   <p:clrMapOvr>
     <a:masterClrMapping/>
   </p:clrMapOvr>
+  <p:timing>
+    <p:tnLst>
+      <p:par>
+        <p:cTn id="1" dur="indefinite" restart="never" nodeType="tmRoot"/>
+      </p:par>
+    </p:tnLst>
+  </p:timing>
 </p:sld>
 </file>
 
@@ -10905,6 +10996,13 @@
   <p:clrMapOvr>
     <a:masterClrMapping/>
   </p:clrMapOvr>
+  <p:timing>
+    <p:tnLst>
+      <p:par>
+        <p:cTn id="1" dur="indefinite" restart="never" nodeType="tmRoot"/>
+      </p:par>
+    </p:tnLst>
+  </p:timing>
 </p:sld>
 </file>
 
@@ -11603,6 +11701,13 @@
   <p:clrMapOvr>
     <a:masterClrMapping/>
   </p:clrMapOvr>
+  <p:timing>
+    <p:tnLst>
+      <p:par>
+        <p:cTn id="1" dur="indefinite" restart="never" nodeType="tmRoot"/>
+      </p:par>
+    </p:tnLst>
+  </p:timing>
 </p:sld>
 </file>
 
@@ -12451,6 +12556,13 @@
   <p:clrMapOvr>
     <a:masterClrMapping/>
   </p:clrMapOvr>
+  <p:timing>
+    <p:tnLst>
+      <p:par>
+        <p:cTn id="1" dur="indefinite" restart="never" nodeType="tmRoot"/>
+      </p:par>
+    </p:tnLst>
+  </p:timing>
 </p:sld>
 </file>
 
@@ -13318,6 +13430,13 @@
   <p:clrMapOvr>
     <a:masterClrMapping/>
   </p:clrMapOvr>
+  <p:timing>
+    <p:tnLst>
+      <p:par>
+        <p:cTn id="1" dur="indefinite" restart="never" nodeType="tmRoot"/>
+      </p:par>
+    </p:tnLst>
+  </p:timing>
 </p:sld>
 </file>
 
@@ -14022,6 +14141,13 @@
   <p:clrMapOvr>
     <a:masterClrMapping/>
   </p:clrMapOvr>
+  <p:timing>
+    <p:tnLst>
+      <p:par>
+        <p:cTn id="1" dur="indefinite" restart="never" nodeType="tmRoot"/>
+      </p:par>
+    </p:tnLst>
+  </p:timing>
 </p:sld>
 </file>
 
@@ -14617,6 +14743,13 @@
   <p:clrMapOvr>
     <a:masterClrMapping/>
   </p:clrMapOvr>
+  <p:timing>
+    <p:tnLst>
+      <p:par>
+        <p:cTn id="1" dur="indefinite" restart="never" nodeType="tmRoot"/>
+      </p:par>
+    </p:tnLst>
+  </p:timing>
 </p:sld>
 </file>
 
@@ -15117,6 +15250,13 @@
   <p:clrMapOvr>
     <a:masterClrMapping/>
   </p:clrMapOvr>
+  <p:timing>
+    <p:tnLst>
+      <p:par>
+        <p:cTn id="1" dur="indefinite" restart="never" nodeType="tmRoot"/>
+      </p:par>
+    </p:tnLst>
+  </p:timing>
 </p:sld>
 </file>
 

</xml_diff>